<commit_message>
Added group by tutorial
</commit_message>
<xml_diff>
--- a/static/sql_diagrams.pptx
+++ b/static/sql_diagrams.pptx
@@ -7,6 +7,8 @@
   <p:sldIdLst>
     <p:sldId id="256" r:id="rId2"/>
     <p:sldId id="257" r:id="rId3"/>
+    <p:sldId id="258" r:id="rId4"/>
+    <p:sldId id="259" r:id="rId5"/>
   </p:sldIdLst>
   <p:sldSz cx="12192000" cy="6858000"/>
   <p:notesSz cx="6858000" cy="9144000"/>
@@ -105,7 +107,184 @@
       </a:defRPr>
     </a:lvl9pPr>
   </p:defaultTextStyle>
+  <p:extLst>
+    <p:ext uri="{EFAFB233-063F-42B5-8137-9DF3F51BA10A}">
+      <p15:sldGuideLst xmlns:p15="http://schemas.microsoft.com/office/powerpoint/2012/main"/>
+    </p:ext>
+  </p:extLst>
 </p:presentation>
+</file>
+
+<file path=ppt/revisionInfo.xml><?xml version="1.0" encoding="utf-8"?>
+<p1510:revInfo xmlns:a="http://schemas.openxmlformats.org/drawingml/2006/main" xmlns:r="http://schemas.openxmlformats.org/officeDocument/2006/relationships" xmlns:p1510="http://schemas.microsoft.com/office/powerpoint/2015/10/main">
+  <p1510:revLst>
+    <p1510:client id="{F1B1CA92-2EA9-4396-9B66-8FF404EAA7EB}" v="5" dt="2023-06-08T18:17:57.736"/>
+  </p1510:revLst>
+</p1510:revInfo>
+</file>
+
+<file path=ppt/changesInfos/changesInfo1.xml><?xml version="1.0" encoding="utf-8"?>
+<pc:chgInfo xmlns:a="http://schemas.openxmlformats.org/drawingml/2006/main" xmlns:r="http://schemas.openxmlformats.org/officeDocument/2006/relationships" xmlns:ac="http://schemas.microsoft.com/office/drawing/2013/main/command" xmlns:pc="http://schemas.microsoft.com/office/powerpoint/2013/main/command">
+  <pc:docChgLst>
+    <pc:chgData name="Nathan Garrett" userId="2e433c4c-36ae-4b16-acdd-ef7227993467" providerId="ADAL" clId="{F1B1CA92-2EA9-4396-9B66-8FF404EAA7EB}"/>
+    <pc:docChg chg="custSel addSld modSld">
+      <pc:chgData name="Nathan Garrett" userId="2e433c4c-36ae-4b16-acdd-ef7227993467" providerId="ADAL" clId="{F1B1CA92-2EA9-4396-9B66-8FF404EAA7EB}" dt="2023-06-08T18:21:05.043" v="512" actId="478"/>
+      <pc:docMkLst>
+        <pc:docMk/>
+      </pc:docMkLst>
+      <pc:sldChg chg="addSp delSp modSp new mod">
+        <pc:chgData name="Nathan Garrett" userId="2e433c4c-36ae-4b16-acdd-ef7227993467" providerId="ADAL" clId="{F1B1CA92-2EA9-4396-9B66-8FF404EAA7EB}" dt="2023-06-07T21:15:38.274" v="329" actId="1076"/>
+        <pc:sldMkLst>
+          <pc:docMk/>
+          <pc:sldMk cId="2998915098" sldId="258"/>
+        </pc:sldMkLst>
+        <pc:spChg chg="add del mod">
+          <ac:chgData name="Nathan Garrett" userId="2e433c4c-36ae-4b16-acdd-ef7227993467" providerId="ADAL" clId="{F1B1CA92-2EA9-4396-9B66-8FF404EAA7EB}" dt="2023-06-07T21:11:18.599" v="199" actId="478"/>
+          <ac:spMkLst>
+            <pc:docMk/>
+            <pc:sldMk cId="2998915098" sldId="258"/>
+            <ac:spMk id="5" creationId="{B15D7A91-1F24-A4D0-8773-B739FAB72C05}"/>
+          </ac:spMkLst>
+        </pc:spChg>
+        <pc:graphicFrameChg chg="add mod modGraphic">
+          <ac:chgData name="Nathan Garrett" userId="2e433c4c-36ae-4b16-acdd-ef7227993467" providerId="ADAL" clId="{F1B1CA92-2EA9-4396-9B66-8FF404EAA7EB}" dt="2023-06-07T21:12:56.750" v="213" actId="207"/>
+          <ac:graphicFrameMkLst>
+            <pc:docMk/>
+            <pc:sldMk cId="2998915098" sldId="258"/>
+            <ac:graphicFrameMk id="2" creationId="{8A9E2A0A-5E70-A8B3-2218-56A1480409AF}"/>
+          </ac:graphicFrameMkLst>
+        </pc:graphicFrameChg>
+        <pc:graphicFrameChg chg="add mod modGraphic">
+          <ac:chgData name="Nathan Garrett" userId="2e433c4c-36ae-4b16-acdd-ef7227993467" providerId="ADAL" clId="{F1B1CA92-2EA9-4396-9B66-8FF404EAA7EB}" dt="2023-06-07T21:13:55.180" v="298" actId="20577"/>
+          <ac:graphicFrameMkLst>
+            <pc:docMk/>
+            <pc:sldMk cId="2998915098" sldId="258"/>
+            <ac:graphicFrameMk id="3" creationId="{61F442A0-F5BB-7EF6-7412-5364F192B490}"/>
+          </ac:graphicFrameMkLst>
+        </pc:graphicFrameChg>
+        <pc:graphicFrameChg chg="add mod modGraphic">
+          <ac:chgData name="Nathan Garrett" userId="2e433c4c-36ae-4b16-acdd-ef7227993467" providerId="ADAL" clId="{F1B1CA92-2EA9-4396-9B66-8FF404EAA7EB}" dt="2023-06-07T21:15:38.274" v="329" actId="1076"/>
+          <ac:graphicFrameMkLst>
+            <pc:docMk/>
+            <pc:sldMk cId="2998915098" sldId="258"/>
+            <ac:graphicFrameMk id="4" creationId="{502EDFBC-1B4A-9851-6605-5A35DBC68DB5}"/>
+          </ac:graphicFrameMkLst>
+        </pc:graphicFrameChg>
+        <pc:cxnChg chg="add mod">
+          <ac:chgData name="Nathan Garrett" userId="2e433c4c-36ae-4b16-acdd-ef7227993467" providerId="ADAL" clId="{F1B1CA92-2EA9-4396-9B66-8FF404EAA7EB}" dt="2023-06-07T21:14:29.840" v="307" actId="14100"/>
+          <ac:cxnSpMkLst>
+            <pc:docMk/>
+            <pc:sldMk cId="2998915098" sldId="258"/>
+            <ac:cxnSpMk id="7" creationId="{FA6CD5F4-2853-ED76-358A-AA6371F8817D}"/>
+          </ac:cxnSpMkLst>
+        </pc:cxnChg>
+        <pc:cxnChg chg="add mod">
+          <ac:chgData name="Nathan Garrett" userId="2e433c4c-36ae-4b16-acdd-ef7227993467" providerId="ADAL" clId="{F1B1CA92-2EA9-4396-9B66-8FF404EAA7EB}" dt="2023-06-07T21:14:27.745" v="306" actId="14100"/>
+          <ac:cxnSpMkLst>
+            <pc:docMk/>
+            <pc:sldMk cId="2998915098" sldId="258"/>
+            <ac:cxnSpMk id="10" creationId="{0285DE3D-5AA4-E4BB-19EF-83DC94F32B52}"/>
+          </ac:cxnSpMkLst>
+        </pc:cxnChg>
+        <pc:cxnChg chg="add mod">
+          <ac:chgData name="Nathan Garrett" userId="2e433c4c-36ae-4b16-acdd-ef7227993467" providerId="ADAL" clId="{F1B1CA92-2EA9-4396-9B66-8FF404EAA7EB}" dt="2023-06-07T21:14:45.067" v="313" actId="208"/>
+          <ac:cxnSpMkLst>
+            <pc:docMk/>
+            <pc:sldMk cId="2998915098" sldId="258"/>
+            <ac:cxnSpMk id="14" creationId="{844368D8-C646-0A64-5D8A-9737F316AD8C}"/>
+          </ac:cxnSpMkLst>
+        </pc:cxnChg>
+        <pc:cxnChg chg="add mod">
+          <ac:chgData name="Nathan Garrett" userId="2e433c4c-36ae-4b16-acdd-ef7227993467" providerId="ADAL" clId="{F1B1CA92-2EA9-4396-9B66-8FF404EAA7EB}" dt="2023-06-07T21:15:25.421" v="325" actId="14100"/>
+          <ac:cxnSpMkLst>
+            <pc:docMk/>
+            <pc:sldMk cId="2998915098" sldId="258"/>
+            <ac:cxnSpMk id="18" creationId="{79EBBC2B-C9A6-D8B8-412A-1114A377EDC8}"/>
+          </ac:cxnSpMkLst>
+        </pc:cxnChg>
+        <pc:cxnChg chg="add mod">
+          <ac:chgData name="Nathan Garrett" userId="2e433c4c-36ae-4b16-acdd-ef7227993467" providerId="ADAL" clId="{F1B1CA92-2EA9-4396-9B66-8FF404EAA7EB}" dt="2023-06-07T21:15:31.315" v="328" actId="1037"/>
+          <ac:cxnSpMkLst>
+            <pc:docMk/>
+            <pc:sldMk cId="2998915098" sldId="258"/>
+            <ac:cxnSpMk id="22" creationId="{BC4A435C-6176-622C-B954-5332AB04F5E7}"/>
+          </ac:cxnSpMkLst>
+        </pc:cxnChg>
+      </pc:sldChg>
+      <pc:sldChg chg="delSp modSp add mod">
+        <pc:chgData name="Nathan Garrett" userId="2e433c4c-36ae-4b16-acdd-ef7227993467" providerId="ADAL" clId="{F1B1CA92-2EA9-4396-9B66-8FF404EAA7EB}" dt="2023-06-08T18:21:05.043" v="512" actId="478"/>
+        <pc:sldMkLst>
+          <pc:docMk/>
+          <pc:sldMk cId="4163003112" sldId="259"/>
+        </pc:sldMkLst>
+        <pc:graphicFrameChg chg="del">
+          <ac:chgData name="Nathan Garrett" userId="2e433c4c-36ae-4b16-acdd-ef7227993467" providerId="ADAL" clId="{F1B1CA92-2EA9-4396-9B66-8FF404EAA7EB}" dt="2023-06-08T18:18:01.504" v="331" actId="478"/>
+          <ac:graphicFrameMkLst>
+            <pc:docMk/>
+            <pc:sldMk cId="4163003112" sldId="259"/>
+            <ac:graphicFrameMk id="2" creationId="{8A9E2A0A-5E70-A8B3-2218-56A1480409AF}"/>
+          </ac:graphicFrameMkLst>
+        </pc:graphicFrameChg>
+        <pc:graphicFrameChg chg="del">
+          <ac:chgData name="Nathan Garrett" userId="2e433c4c-36ae-4b16-acdd-ef7227993467" providerId="ADAL" clId="{F1B1CA92-2EA9-4396-9B66-8FF404EAA7EB}" dt="2023-06-08T18:18:03.245" v="332" actId="478"/>
+          <ac:graphicFrameMkLst>
+            <pc:docMk/>
+            <pc:sldMk cId="4163003112" sldId="259"/>
+            <ac:graphicFrameMk id="3" creationId="{61F442A0-F5BB-7EF6-7412-5364F192B490}"/>
+          </ac:graphicFrameMkLst>
+        </pc:graphicFrameChg>
+        <pc:graphicFrameChg chg="mod modGraphic">
+          <ac:chgData name="Nathan Garrett" userId="2e433c4c-36ae-4b16-acdd-ef7227993467" providerId="ADAL" clId="{F1B1CA92-2EA9-4396-9B66-8FF404EAA7EB}" dt="2023-06-08T18:20:59.114" v="510" actId="20577"/>
+          <ac:graphicFrameMkLst>
+            <pc:docMk/>
+            <pc:sldMk cId="4163003112" sldId="259"/>
+            <ac:graphicFrameMk id="4" creationId="{502EDFBC-1B4A-9851-6605-5A35DBC68DB5}"/>
+          </ac:graphicFrameMkLst>
+        </pc:graphicFrameChg>
+        <pc:cxnChg chg="del">
+          <ac:chgData name="Nathan Garrett" userId="2e433c4c-36ae-4b16-acdd-ef7227993467" providerId="ADAL" clId="{F1B1CA92-2EA9-4396-9B66-8FF404EAA7EB}" dt="2023-06-08T18:18:04.142" v="333" actId="478"/>
+          <ac:cxnSpMkLst>
+            <pc:docMk/>
+            <pc:sldMk cId="4163003112" sldId="259"/>
+            <ac:cxnSpMk id="7" creationId="{FA6CD5F4-2853-ED76-358A-AA6371F8817D}"/>
+          </ac:cxnSpMkLst>
+        </pc:cxnChg>
+        <pc:cxnChg chg="del">
+          <ac:chgData name="Nathan Garrett" userId="2e433c4c-36ae-4b16-acdd-ef7227993467" providerId="ADAL" clId="{F1B1CA92-2EA9-4396-9B66-8FF404EAA7EB}" dt="2023-06-08T18:18:05.048" v="334" actId="478"/>
+          <ac:cxnSpMkLst>
+            <pc:docMk/>
+            <pc:sldMk cId="4163003112" sldId="259"/>
+            <ac:cxnSpMk id="10" creationId="{0285DE3D-5AA4-E4BB-19EF-83DC94F32B52}"/>
+          </ac:cxnSpMkLst>
+        </pc:cxnChg>
+        <pc:cxnChg chg="del">
+          <ac:chgData name="Nathan Garrett" userId="2e433c4c-36ae-4b16-acdd-ef7227993467" providerId="ADAL" clId="{F1B1CA92-2EA9-4396-9B66-8FF404EAA7EB}" dt="2023-06-08T18:18:05.833" v="335" actId="478"/>
+          <ac:cxnSpMkLst>
+            <pc:docMk/>
+            <pc:sldMk cId="4163003112" sldId="259"/>
+            <ac:cxnSpMk id="14" creationId="{844368D8-C646-0A64-5D8A-9737F316AD8C}"/>
+          </ac:cxnSpMkLst>
+        </pc:cxnChg>
+        <pc:cxnChg chg="del">
+          <ac:chgData name="Nathan Garrett" userId="2e433c4c-36ae-4b16-acdd-ef7227993467" providerId="ADAL" clId="{F1B1CA92-2EA9-4396-9B66-8FF404EAA7EB}" dt="2023-06-08T18:21:04.586" v="511" actId="478"/>
+          <ac:cxnSpMkLst>
+            <pc:docMk/>
+            <pc:sldMk cId="4163003112" sldId="259"/>
+            <ac:cxnSpMk id="18" creationId="{79EBBC2B-C9A6-D8B8-412A-1114A377EDC8}"/>
+          </ac:cxnSpMkLst>
+        </pc:cxnChg>
+        <pc:cxnChg chg="del">
+          <ac:chgData name="Nathan Garrett" userId="2e433c4c-36ae-4b16-acdd-ef7227993467" providerId="ADAL" clId="{F1B1CA92-2EA9-4396-9B66-8FF404EAA7EB}" dt="2023-06-08T18:21:05.043" v="512" actId="478"/>
+          <ac:cxnSpMkLst>
+            <pc:docMk/>
+            <pc:sldMk cId="4163003112" sldId="259"/>
+            <ac:cxnSpMk id="22" creationId="{BC4A435C-6176-622C-B954-5332AB04F5E7}"/>
+          </ac:cxnSpMkLst>
+        </pc:cxnChg>
+      </pc:sldChg>
+    </pc:docChg>
+  </pc:docChgLst>
+</pc:chgInfo>
 </file>
 
 <file path=ppt/slideLayouts/slideLayout1.xml><?xml version="1.0" encoding="utf-8"?>
@@ -255,7 +434,7 @@
           <a:p>
             <a:fld id="{0339E4CC-4270-4741-9D9C-4EED5D926DBA}" type="datetimeFigureOut">
               <a:rPr lang="en-US" smtClean="0"/>
-              <a:t>6/6/2023</a:t>
+              <a:t>6/7/2023</a:t>
             </a:fld>
             <a:endParaRPr lang="en-US"/>
           </a:p>
@@ -453,7 +632,7 @@
           <a:p>
             <a:fld id="{0339E4CC-4270-4741-9D9C-4EED5D926DBA}" type="datetimeFigureOut">
               <a:rPr lang="en-US" smtClean="0"/>
-              <a:t>6/6/2023</a:t>
+              <a:t>6/7/2023</a:t>
             </a:fld>
             <a:endParaRPr lang="en-US"/>
           </a:p>
@@ -661,7 +840,7 @@
           <a:p>
             <a:fld id="{0339E4CC-4270-4741-9D9C-4EED5D926DBA}" type="datetimeFigureOut">
               <a:rPr lang="en-US" smtClean="0"/>
-              <a:t>6/6/2023</a:t>
+              <a:t>6/7/2023</a:t>
             </a:fld>
             <a:endParaRPr lang="en-US"/>
           </a:p>
@@ -859,7 +1038,7 @@
           <a:p>
             <a:fld id="{0339E4CC-4270-4741-9D9C-4EED5D926DBA}" type="datetimeFigureOut">
               <a:rPr lang="en-US" smtClean="0"/>
-              <a:t>6/6/2023</a:t>
+              <a:t>6/7/2023</a:t>
             </a:fld>
             <a:endParaRPr lang="en-US"/>
           </a:p>
@@ -1134,7 +1313,7 @@
           <a:p>
             <a:fld id="{0339E4CC-4270-4741-9D9C-4EED5D926DBA}" type="datetimeFigureOut">
               <a:rPr lang="en-US" smtClean="0"/>
-              <a:t>6/6/2023</a:t>
+              <a:t>6/7/2023</a:t>
             </a:fld>
             <a:endParaRPr lang="en-US"/>
           </a:p>
@@ -1399,7 +1578,7 @@
           <a:p>
             <a:fld id="{0339E4CC-4270-4741-9D9C-4EED5D926DBA}" type="datetimeFigureOut">
               <a:rPr lang="en-US" smtClean="0"/>
-              <a:t>6/6/2023</a:t>
+              <a:t>6/7/2023</a:t>
             </a:fld>
             <a:endParaRPr lang="en-US"/>
           </a:p>
@@ -1811,7 +1990,7 @@
           <a:p>
             <a:fld id="{0339E4CC-4270-4741-9D9C-4EED5D926DBA}" type="datetimeFigureOut">
               <a:rPr lang="en-US" smtClean="0"/>
-              <a:t>6/6/2023</a:t>
+              <a:t>6/7/2023</a:t>
             </a:fld>
             <a:endParaRPr lang="en-US"/>
           </a:p>
@@ -1952,7 +2131,7 @@
           <a:p>
             <a:fld id="{0339E4CC-4270-4741-9D9C-4EED5D926DBA}" type="datetimeFigureOut">
               <a:rPr lang="en-US" smtClean="0"/>
-              <a:t>6/6/2023</a:t>
+              <a:t>6/7/2023</a:t>
             </a:fld>
             <a:endParaRPr lang="en-US"/>
           </a:p>
@@ -2065,7 +2244,7 @@
           <a:p>
             <a:fld id="{0339E4CC-4270-4741-9D9C-4EED5D926DBA}" type="datetimeFigureOut">
               <a:rPr lang="en-US" smtClean="0"/>
-              <a:t>6/6/2023</a:t>
+              <a:t>6/7/2023</a:t>
             </a:fld>
             <a:endParaRPr lang="en-US"/>
           </a:p>
@@ -2376,7 +2555,7 @@
           <a:p>
             <a:fld id="{0339E4CC-4270-4741-9D9C-4EED5D926DBA}" type="datetimeFigureOut">
               <a:rPr lang="en-US" smtClean="0"/>
-              <a:t>6/6/2023</a:t>
+              <a:t>6/7/2023</a:t>
             </a:fld>
             <a:endParaRPr lang="en-US"/>
           </a:p>
@@ -2664,7 +2843,7 @@
           <a:p>
             <a:fld id="{0339E4CC-4270-4741-9D9C-4EED5D926DBA}" type="datetimeFigureOut">
               <a:rPr lang="en-US" smtClean="0"/>
-              <a:t>6/6/2023</a:t>
+              <a:t>6/7/2023</a:t>
             </a:fld>
             <a:endParaRPr lang="en-US"/>
           </a:p>
@@ -2905,7 +3084,7 @@
           <a:p>
             <a:fld id="{0339E4CC-4270-4741-9D9C-4EED5D926DBA}" type="datetimeFigureOut">
               <a:rPr lang="en-US" smtClean="0"/>
-              <a:t>6/6/2023</a:t>
+              <a:t>6/7/2023</a:t>
             </a:fld>
             <a:endParaRPr lang="en-US"/>
           </a:p>
@@ -3868,6 +4047,2151 @@
 </p:sld>
 </file>
 
+<file path=ppt/slides/slide3.xml><?xml version="1.0" encoding="utf-8"?>
+<p:sld xmlns:a="http://schemas.openxmlformats.org/drawingml/2006/main" xmlns:r="http://schemas.openxmlformats.org/officeDocument/2006/relationships" xmlns:p="http://schemas.openxmlformats.org/presentationml/2006/main">
+  <p:cSld>
+    <p:spTree>
+      <p:nvGrpSpPr>
+        <p:cNvPr id="1" name=""/>
+        <p:cNvGrpSpPr/>
+        <p:nvPr/>
+      </p:nvGrpSpPr>
+      <p:grpSpPr>
+        <a:xfrm>
+          <a:off x="0" y="0"/>
+          <a:ext cx="0" cy="0"/>
+          <a:chOff x="0" y="0"/>
+          <a:chExt cx="0" cy="0"/>
+        </a:xfrm>
+      </p:grpSpPr>
+      <p:graphicFrame>
+        <p:nvGraphicFramePr>
+          <p:cNvPr id="2" name="Table 2">
+            <a:extLst>
+              <a:ext uri="{FF2B5EF4-FFF2-40B4-BE49-F238E27FC236}">
+                <a16:creationId xmlns:a16="http://schemas.microsoft.com/office/drawing/2014/main" id="{8A9E2A0A-5E70-A8B3-2218-56A1480409AF}"/>
+              </a:ext>
+            </a:extLst>
+          </p:cNvPr>
+          <p:cNvGraphicFramePr>
+            <a:graphicFrameLocks noGrp="1"/>
+          </p:cNvGraphicFramePr>
+          <p:nvPr>
+            <p:extLst>
+              <p:ext uri="{D42A27DB-BD31-4B8C-83A1-F6EECF244321}">
+                <p14:modId xmlns:p14="http://schemas.microsoft.com/office/powerpoint/2010/main" val="655955803"/>
+              </p:ext>
+            </p:extLst>
+          </p:nvPr>
+        </p:nvGraphicFramePr>
+        <p:xfrm>
+          <a:off x="556768" y="2267712"/>
+          <a:ext cx="4198112" cy="2987040"/>
+        </p:xfrm>
+        <a:graphic>
+          <a:graphicData uri="http://schemas.openxmlformats.org/drawingml/2006/table">
+            <a:tbl>
+              <a:tblPr firstRow="1" bandRow="1">
+                <a:tableStyleId>{7E9639D4-E3E2-4D34-9284-5A2195B3D0D7}</a:tableStyleId>
+              </a:tblPr>
+              <a:tblGrid>
+                <a:gridCol w="1049528">
+                  <a:extLst>
+                    <a:ext uri="{9D8B030D-6E8A-4147-A177-3AD203B41FA5}">
+                      <a16:colId xmlns:a16="http://schemas.microsoft.com/office/drawing/2014/main" val="713384858"/>
+                    </a:ext>
+                  </a:extLst>
+                </a:gridCol>
+                <a:gridCol w="1049528">
+                  <a:extLst>
+                    <a:ext uri="{9D8B030D-6E8A-4147-A177-3AD203B41FA5}">
+                      <a16:colId xmlns:a16="http://schemas.microsoft.com/office/drawing/2014/main" val="2076429656"/>
+                    </a:ext>
+                  </a:extLst>
+                </a:gridCol>
+                <a:gridCol w="1049528">
+                  <a:extLst>
+                    <a:ext uri="{9D8B030D-6E8A-4147-A177-3AD203B41FA5}">
+                      <a16:colId xmlns:a16="http://schemas.microsoft.com/office/drawing/2014/main" val="1430714583"/>
+                    </a:ext>
+                  </a:extLst>
+                </a:gridCol>
+                <a:gridCol w="1049528">
+                  <a:extLst>
+                    <a:ext uri="{9D8B030D-6E8A-4147-A177-3AD203B41FA5}">
+                      <a16:colId xmlns:a16="http://schemas.microsoft.com/office/drawing/2014/main" val="423606016"/>
+                    </a:ext>
+                  </a:extLst>
+                </a:gridCol>
+              </a:tblGrid>
+              <a:tr h="597408">
+                <a:tc>
+                  <a:txBody>
+                    <a:bodyPr/>
+                    <a:lstStyle/>
+                    <a:p>
+                      <a:pPr algn="ctr"/>
+                      <a:r>
+                        <a:rPr lang="en-US" dirty="0"/>
+                        <a:t>Sale PK</a:t>
+                      </a:r>
+                    </a:p>
+                  </a:txBody>
+                  <a:tcPr anchor="ctr"/>
+                </a:tc>
+                <a:tc>
+                  <a:txBody>
+                    <a:bodyPr/>
+                    <a:lstStyle/>
+                    <a:p>
+                      <a:pPr algn="ctr"/>
+                      <a:r>
+                        <a:rPr lang="en-US" dirty="0"/>
+                        <a:t>Price</a:t>
+                      </a:r>
+                    </a:p>
+                  </a:txBody>
+                  <a:tcPr anchor="ctr"/>
+                </a:tc>
+                <a:tc>
+                  <a:txBody>
+                    <a:bodyPr/>
+                    <a:lstStyle/>
+                    <a:p>
+                      <a:pPr algn="ctr"/>
+                      <a:r>
+                        <a:rPr lang="en-US" dirty="0"/>
+                        <a:t>Person</a:t>
+                      </a:r>
+                    </a:p>
+                  </a:txBody>
+                  <a:tcPr anchor="ctr"/>
+                </a:tc>
+                <a:tc>
+                  <a:txBody>
+                    <a:bodyPr/>
+                    <a:lstStyle/>
+                    <a:p>
+                      <a:pPr algn="ctr"/>
+                      <a:r>
+                        <a:rPr lang="en-US" dirty="0"/>
+                        <a:t>Month</a:t>
+                      </a:r>
+                    </a:p>
+                  </a:txBody>
+                  <a:tcPr anchor="ctr"/>
+                </a:tc>
+                <a:extLst>
+                  <a:ext uri="{0D108BD9-81ED-4DB2-BD59-A6C34878D82A}">
+                    <a16:rowId xmlns:a16="http://schemas.microsoft.com/office/drawing/2014/main" val="1417055643"/>
+                  </a:ext>
+                </a:extLst>
+              </a:tr>
+              <a:tr h="597408">
+                <a:tc>
+                  <a:txBody>
+                    <a:bodyPr/>
+                    <a:lstStyle/>
+                    <a:p>
+                      <a:pPr algn="ctr"/>
+                      <a:r>
+                        <a:rPr lang="en-US" dirty="0"/>
+                        <a:t>1</a:t>
+                      </a:r>
+                    </a:p>
+                  </a:txBody>
+                  <a:tcPr anchor="ctr"/>
+                </a:tc>
+                <a:tc>
+                  <a:txBody>
+                    <a:bodyPr/>
+                    <a:lstStyle/>
+                    <a:p>
+                      <a:pPr algn="ctr"/>
+                      <a:r>
+                        <a:rPr lang="en-US" dirty="0"/>
+                        <a:t>$40</a:t>
+                      </a:r>
+                    </a:p>
+                  </a:txBody>
+                  <a:tcPr anchor="ctr"/>
+                </a:tc>
+                <a:tc>
+                  <a:txBody>
+                    <a:bodyPr/>
+                    <a:lstStyle/>
+                    <a:p>
+                      <a:pPr algn="ctr"/>
+                      <a:r>
+                        <a:rPr lang="en-US" dirty="0">
+                          <a:solidFill>
+                            <a:srgbClr val="00B050"/>
+                          </a:solidFill>
+                        </a:rPr>
+                        <a:t>Bob</a:t>
+                      </a:r>
+                    </a:p>
+                  </a:txBody>
+                  <a:tcPr anchor="ctr"/>
+                </a:tc>
+                <a:tc>
+                  <a:txBody>
+                    <a:bodyPr/>
+                    <a:lstStyle/>
+                    <a:p>
+                      <a:pPr algn="ctr"/>
+                      <a:r>
+                        <a:rPr lang="en-US" dirty="0">
+                          <a:solidFill>
+                            <a:srgbClr val="00B0F0"/>
+                          </a:solidFill>
+                        </a:rPr>
+                        <a:t>January</a:t>
+                      </a:r>
+                    </a:p>
+                  </a:txBody>
+                  <a:tcPr anchor="ctr"/>
+                </a:tc>
+                <a:extLst>
+                  <a:ext uri="{0D108BD9-81ED-4DB2-BD59-A6C34878D82A}">
+                    <a16:rowId xmlns:a16="http://schemas.microsoft.com/office/drawing/2014/main" val="3388458451"/>
+                  </a:ext>
+                </a:extLst>
+              </a:tr>
+              <a:tr h="597408">
+                <a:tc>
+                  <a:txBody>
+                    <a:bodyPr/>
+                    <a:lstStyle/>
+                    <a:p>
+                      <a:pPr algn="ctr"/>
+                      <a:r>
+                        <a:rPr lang="en-US" dirty="0"/>
+                        <a:t>2</a:t>
+                      </a:r>
+                    </a:p>
+                  </a:txBody>
+                  <a:tcPr anchor="ctr"/>
+                </a:tc>
+                <a:tc>
+                  <a:txBody>
+                    <a:bodyPr/>
+                    <a:lstStyle/>
+                    <a:p>
+                      <a:pPr algn="ctr"/>
+                      <a:r>
+                        <a:rPr lang="en-US" dirty="0"/>
+                        <a:t>$50</a:t>
+                      </a:r>
+                    </a:p>
+                  </a:txBody>
+                  <a:tcPr anchor="ctr"/>
+                </a:tc>
+                <a:tc>
+                  <a:txBody>
+                    <a:bodyPr/>
+                    <a:lstStyle/>
+                    <a:p>
+                      <a:pPr algn="ctr"/>
+                      <a:r>
+                        <a:rPr lang="en-US" dirty="0">
+                          <a:solidFill>
+                            <a:srgbClr val="00B050"/>
+                          </a:solidFill>
+                        </a:rPr>
+                        <a:t>Sarah</a:t>
+                      </a:r>
+                    </a:p>
+                  </a:txBody>
+                  <a:tcPr anchor="ctr"/>
+                </a:tc>
+                <a:tc>
+                  <a:txBody>
+                    <a:bodyPr/>
+                    <a:lstStyle/>
+                    <a:p>
+                      <a:pPr algn="ctr"/>
+                      <a:r>
+                        <a:rPr lang="en-US" dirty="0">
+                          <a:solidFill>
+                            <a:srgbClr val="00B0F0"/>
+                          </a:solidFill>
+                        </a:rPr>
+                        <a:t>January</a:t>
+                      </a:r>
+                    </a:p>
+                  </a:txBody>
+                  <a:tcPr anchor="ctr"/>
+                </a:tc>
+                <a:extLst>
+                  <a:ext uri="{0D108BD9-81ED-4DB2-BD59-A6C34878D82A}">
+                    <a16:rowId xmlns:a16="http://schemas.microsoft.com/office/drawing/2014/main" val="3361444078"/>
+                  </a:ext>
+                </a:extLst>
+              </a:tr>
+              <a:tr h="597408">
+                <a:tc>
+                  <a:txBody>
+                    <a:bodyPr/>
+                    <a:lstStyle/>
+                    <a:p>
+                      <a:pPr algn="ctr"/>
+                      <a:r>
+                        <a:rPr lang="en-US" dirty="0"/>
+                        <a:t>3</a:t>
+                      </a:r>
+                    </a:p>
+                  </a:txBody>
+                  <a:tcPr anchor="ctr"/>
+                </a:tc>
+                <a:tc>
+                  <a:txBody>
+                    <a:bodyPr/>
+                    <a:lstStyle/>
+                    <a:p>
+                      <a:pPr algn="ctr"/>
+                      <a:r>
+                        <a:rPr lang="en-US" dirty="0"/>
+                        <a:t>$30</a:t>
+                      </a:r>
+                    </a:p>
+                  </a:txBody>
+                  <a:tcPr anchor="ctr"/>
+                </a:tc>
+                <a:tc>
+                  <a:txBody>
+                    <a:bodyPr/>
+                    <a:lstStyle/>
+                    <a:p>
+                      <a:pPr algn="ctr"/>
+                      <a:r>
+                        <a:rPr lang="en-US" dirty="0">
+                          <a:solidFill>
+                            <a:srgbClr val="00B050"/>
+                          </a:solidFill>
+                        </a:rPr>
+                        <a:t>Bob</a:t>
+                      </a:r>
+                    </a:p>
+                  </a:txBody>
+                  <a:tcPr anchor="ctr"/>
+                </a:tc>
+                <a:tc>
+                  <a:txBody>
+                    <a:bodyPr/>
+                    <a:lstStyle/>
+                    <a:p>
+                      <a:pPr algn="ctr"/>
+                      <a:r>
+                        <a:rPr lang="en-US" dirty="0">
+                          <a:solidFill>
+                            <a:srgbClr val="00B0F0"/>
+                          </a:solidFill>
+                        </a:rPr>
+                        <a:t>March</a:t>
+                      </a:r>
+                    </a:p>
+                  </a:txBody>
+                  <a:tcPr anchor="ctr"/>
+                </a:tc>
+                <a:extLst>
+                  <a:ext uri="{0D108BD9-81ED-4DB2-BD59-A6C34878D82A}">
+                    <a16:rowId xmlns:a16="http://schemas.microsoft.com/office/drawing/2014/main" val="607655854"/>
+                  </a:ext>
+                </a:extLst>
+              </a:tr>
+              <a:tr h="597408">
+                <a:tc>
+                  <a:txBody>
+                    <a:bodyPr/>
+                    <a:lstStyle/>
+                    <a:p>
+                      <a:pPr algn="ctr"/>
+                      <a:r>
+                        <a:rPr lang="en-US" dirty="0"/>
+                        <a:t>4</a:t>
+                      </a:r>
+                    </a:p>
+                  </a:txBody>
+                  <a:tcPr anchor="ctr"/>
+                </a:tc>
+                <a:tc>
+                  <a:txBody>
+                    <a:bodyPr/>
+                    <a:lstStyle/>
+                    <a:p>
+                      <a:pPr algn="ctr"/>
+                      <a:r>
+                        <a:rPr lang="en-US" dirty="0"/>
+                        <a:t>$20</a:t>
+                      </a:r>
+                    </a:p>
+                  </a:txBody>
+                  <a:tcPr anchor="ctr"/>
+                </a:tc>
+                <a:tc>
+                  <a:txBody>
+                    <a:bodyPr/>
+                    <a:lstStyle/>
+                    <a:p>
+                      <a:pPr algn="ctr"/>
+                      <a:r>
+                        <a:rPr lang="en-US" dirty="0">
+                          <a:solidFill>
+                            <a:srgbClr val="00B050"/>
+                          </a:solidFill>
+                        </a:rPr>
+                        <a:t>Joe</a:t>
+                      </a:r>
+                    </a:p>
+                  </a:txBody>
+                  <a:tcPr anchor="ctr"/>
+                </a:tc>
+                <a:tc>
+                  <a:txBody>
+                    <a:bodyPr/>
+                    <a:lstStyle/>
+                    <a:p>
+                      <a:pPr algn="ctr"/>
+                      <a:r>
+                        <a:rPr lang="en-US" dirty="0">
+                          <a:solidFill>
+                            <a:srgbClr val="00B0F0"/>
+                          </a:solidFill>
+                        </a:rPr>
+                        <a:t>April</a:t>
+                      </a:r>
+                    </a:p>
+                  </a:txBody>
+                  <a:tcPr anchor="ctr"/>
+                </a:tc>
+                <a:extLst>
+                  <a:ext uri="{0D108BD9-81ED-4DB2-BD59-A6C34878D82A}">
+                    <a16:rowId xmlns:a16="http://schemas.microsoft.com/office/drawing/2014/main" val="3754639304"/>
+                  </a:ext>
+                </a:extLst>
+              </a:tr>
+            </a:tbl>
+          </a:graphicData>
+        </a:graphic>
+      </p:graphicFrame>
+      <p:graphicFrame>
+        <p:nvGraphicFramePr>
+          <p:cNvPr id="3" name="Table 3">
+            <a:extLst>
+              <a:ext uri="{FF2B5EF4-FFF2-40B4-BE49-F238E27FC236}">
+                <a16:creationId xmlns:a16="http://schemas.microsoft.com/office/drawing/2014/main" id="{61F442A0-F5BB-7EF6-7412-5364F192B490}"/>
+              </a:ext>
+            </a:extLst>
+          </p:cNvPr>
+          <p:cNvGraphicFramePr>
+            <a:graphicFrameLocks noGrp="1"/>
+          </p:cNvGraphicFramePr>
+          <p:nvPr>
+            <p:extLst>
+              <p:ext uri="{D42A27DB-BD31-4B8C-83A1-F6EECF244321}">
+                <p14:modId xmlns:p14="http://schemas.microsoft.com/office/powerpoint/2010/main" val="2041016798"/>
+              </p:ext>
+            </p:extLst>
+          </p:nvPr>
+        </p:nvGraphicFramePr>
+        <p:xfrm>
+          <a:off x="5620512" y="768435"/>
+          <a:ext cx="3868929" cy="2121070"/>
+        </p:xfrm>
+        <a:graphic>
+          <a:graphicData uri="http://schemas.openxmlformats.org/drawingml/2006/table">
+            <a:tbl>
+              <a:tblPr firstRow="1" bandRow="1">
+                <a:tableStyleId>{7E9639D4-E3E2-4D34-9284-5A2195B3D0D7}</a:tableStyleId>
+              </a:tblPr>
+              <a:tblGrid>
+                <a:gridCol w="1289643">
+                  <a:extLst>
+                    <a:ext uri="{9D8B030D-6E8A-4147-A177-3AD203B41FA5}">
+                      <a16:colId xmlns:a16="http://schemas.microsoft.com/office/drawing/2014/main" val="1702040945"/>
+                    </a:ext>
+                  </a:extLst>
+                </a:gridCol>
+                <a:gridCol w="1289643">
+                  <a:extLst>
+                    <a:ext uri="{9D8B030D-6E8A-4147-A177-3AD203B41FA5}">
+                      <a16:colId xmlns:a16="http://schemas.microsoft.com/office/drawing/2014/main" val="3705740454"/>
+                    </a:ext>
+                  </a:extLst>
+                </a:gridCol>
+                <a:gridCol w="1289643">
+                  <a:extLst>
+                    <a:ext uri="{9D8B030D-6E8A-4147-A177-3AD203B41FA5}">
+                      <a16:colId xmlns:a16="http://schemas.microsoft.com/office/drawing/2014/main" val="1217080932"/>
+                    </a:ext>
+                  </a:extLst>
+                </a:gridCol>
+              </a:tblGrid>
+              <a:tr h="424214">
+                <a:tc>
+                  <a:txBody>
+                    <a:bodyPr/>
+                    <a:lstStyle/>
+                    <a:p>
+                      <a:pPr algn="ctr"/>
+                      <a:r>
+                        <a:rPr lang="en-US" dirty="0"/>
+                        <a:t>Month</a:t>
+                      </a:r>
+                    </a:p>
+                  </a:txBody>
+                  <a:tcPr/>
+                </a:tc>
+                <a:tc>
+                  <a:txBody>
+                    <a:bodyPr/>
+                    <a:lstStyle/>
+                    <a:p>
+                      <a:pPr algn="ctr"/>
+                      <a:r>
+                        <a:rPr lang="en-US" dirty="0"/>
+                        <a:t>Hire Bonus</a:t>
+                      </a:r>
+                    </a:p>
+                  </a:txBody>
+                  <a:tcPr/>
+                </a:tc>
+                <a:tc>
+                  <a:txBody>
+                    <a:bodyPr/>
+                    <a:lstStyle/>
+                    <a:p>
+                      <a:pPr algn="ctr"/>
+                      <a:r>
+                        <a:rPr lang="en-US" dirty="0"/>
+                        <a:t>Sale Bonus</a:t>
+                      </a:r>
+                    </a:p>
+                  </a:txBody>
+                  <a:tcPr/>
+                </a:tc>
+                <a:extLst>
+                  <a:ext uri="{0D108BD9-81ED-4DB2-BD59-A6C34878D82A}">
+                    <a16:rowId xmlns:a16="http://schemas.microsoft.com/office/drawing/2014/main" val="1579985967"/>
+                  </a:ext>
+                </a:extLst>
+              </a:tr>
+              <a:tr h="424214">
+                <a:tc>
+                  <a:txBody>
+                    <a:bodyPr/>
+                    <a:lstStyle/>
+                    <a:p>
+                      <a:pPr algn="ctr"/>
+                      <a:r>
+                        <a:rPr lang="en-US" dirty="0">
+                          <a:solidFill>
+                            <a:schemeClr val="tx1"/>
+                          </a:solidFill>
+                        </a:rPr>
+                        <a:t>January</a:t>
+                      </a:r>
+                    </a:p>
+                  </a:txBody>
+                  <a:tcPr>
+                    <a:solidFill>
+                      <a:schemeClr val="accent5">
+                        <a:lumMod val="20000"/>
+                        <a:lumOff val="80000"/>
+                      </a:schemeClr>
+                    </a:solidFill>
+                  </a:tcPr>
+                </a:tc>
+                <a:tc>
+                  <a:txBody>
+                    <a:bodyPr/>
+                    <a:lstStyle/>
+                    <a:p>
+                      <a:pPr algn="ctr"/>
+                      <a:r>
+                        <a:rPr lang="en-US" dirty="0"/>
+                        <a:t>$100</a:t>
+                      </a:r>
+                    </a:p>
+                  </a:txBody>
+                  <a:tcPr/>
+                </a:tc>
+                <a:tc>
+                  <a:txBody>
+                    <a:bodyPr/>
+                    <a:lstStyle/>
+                    <a:p>
+                      <a:pPr algn="ctr"/>
+                      <a:r>
+                        <a:rPr lang="en-US" dirty="0"/>
+                        <a:t>$40</a:t>
+                      </a:r>
+                    </a:p>
+                  </a:txBody>
+                  <a:tcPr/>
+                </a:tc>
+                <a:extLst>
+                  <a:ext uri="{0D108BD9-81ED-4DB2-BD59-A6C34878D82A}">
+                    <a16:rowId xmlns:a16="http://schemas.microsoft.com/office/drawing/2014/main" val="2559393424"/>
+                  </a:ext>
+                </a:extLst>
+              </a:tr>
+              <a:tr h="424214">
+                <a:tc>
+                  <a:txBody>
+                    <a:bodyPr/>
+                    <a:lstStyle/>
+                    <a:p>
+                      <a:pPr algn="ctr"/>
+                      <a:r>
+                        <a:rPr lang="en-US" dirty="0">
+                          <a:solidFill>
+                            <a:schemeClr val="tx1"/>
+                          </a:solidFill>
+                        </a:rPr>
+                        <a:t>February</a:t>
+                      </a:r>
+                    </a:p>
+                  </a:txBody>
+                  <a:tcPr>
+                    <a:solidFill>
+                      <a:schemeClr val="accent5">
+                        <a:lumMod val="20000"/>
+                        <a:lumOff val="80000"/>
+                      </a:schemeClr>
+                    </a:solidFill>
+                  </a:tcPr>
+                </a:tc>
+                <a:tc>
+                  <a:txBody>
+                    <a:bodyPr/>
+                    <a:lstStyle/>
+                    <a:p>
+                      <a:pPr algn="ctr"/>
+                      <a:r>
+                        <a:rPr lang="en-US" dirty="0"/>
+                        <a:t>$200</a:t>
+                      </a:r>
+                    </a:p>
+                  </a:txBody>
+                  <a:tcPr/>
+                </a:tc>
+                <a:tc>
+                  <a:txBody>
+                    <a:bodyPr/>
+                    <a:lstStyle/>
+                    <a:p>
+                      <a:pPr algn="ctr"/>
+                      <a:r>
+                        <a:rPr lang="en-US" dirty="0"/>
+                        <a:t>$20</a:t>
+                      </a:r>
+                    </a:p>
+                  </a:txBody>
+                  <a:tcPr/>
+                </a:tc>
+                <a:extLst>
+                  <a:ext uri="{0D108BD9-81ED-4DB2-BD59-A6C34878D82A}">
+                    <a16:rowId xmlns:a16="http://schemas.microsoft.com/office/drawing/2014/main" val="3743697260"/>
+                  </a:ext>
+                </a:extLst>
+              </a:tr>
+              <a:tr h="424214">
+                <a:tc>
+                  <a:txBody>
+                    <a:bodyPr/>
+                    <a:lstStyle/>
+                    <a:p>
+                      <a:pPr algn="ctr"/>
+                      <a:r>
+                        <a:rPr lang="en-US" dirty="0">
+                          <a:solidFill>
+                            <a:schemeClr val="tx1"/>
+                          </a:solidFill>
+                        </a:rPr>
+                        <a:t>March</a:t>
+                      </a:r>
+                    </a:p>
+                  </a:txBody>
+                  <a:tcPr>
+                    <a:solidFill>
+                      <a:schemeClr val="accent5">
+                        <a:lumMod val="20000"/>
+                        <a:lumOff val="80000"/>
+                      </a:schemeClr>
+                    </a:solidFill>
+                  </a:tcPr>
+                </a:tc>
+                <a:tc>
+                  <a:txBody>
+                    <a:bodyPr/>
+                    <a:lstStyle/>
+                    <a:p>
+                      <a:pPr algn="ctr"/>
+                      <a:r>
+                        <a:rPr lang="en-US" dirty="0"/>
+                        <a:t>$300</a:t>
+                      </a:r>
+                    </a:p>
+                  </a:txBody>
+                  <a:tcPr/>
+                </a:tc>
+                <a:tc>
+                  <a:txBody>
+                    <a:bodyPr/>
+                    <a:lstStyle/>
+                    <a:p>
+                      <a:pPr algn="ctr"/>
+                      <a:r>
+                        <a:rPr lang="en-US" dirty="0"/>
+                        <a:t>$20</a:t>
+                      </a:r>
+                    </a:p>
+                  </a:txBody>
+                  <a:tcPr/>
+                </a:tc>
+                <a:extLst>
+                  <a:ext uri="{0D108BD9-81ED-4DB2-BD59-A6C34878D82A}">
+                    <a16:rowId xmlns:a16="http://schemas.microsoft.com/office/drawing/2014/main" val="800216759"/>
+                  </a:ext>
+                </a:extLst>
+              </a:tr>
+              <a:tr h="424214">
+                <a:tc>
+                  <a:txBody>
+                    <a:bodyPr/>
+                    <a:lstStyle/>
+                    <a:p>
+                      <a:pPr algn="ctr"/>
+                      <a:r>
+                        <a:rPr lang="en-US" dirty="0">
+                          <a:solidFill>
+                            <a:schemeClr val="tx1"/>
+                          </a:solidFill>
+                        </a:rPr>
+                        <a:t>April</a:t>
+                      </a:r>
+                    </a:p>
+                  </a:txBody>
+                  <a:tcPr>
+                    <a:solidFill>
+                      <a:schemeClr val="accent5">
+                        <a:lumMod val="20000"/>
+                        <a:lumOff val="80000"/>
+                      </a:schemeClr>
+                    </a:solidFill>
+                  </a:tcPr>
+                </a:tc>
+                <a:tc>
+                  <a:txBody>
+                    <a:bodyPr/>
+                    <a:lstStyle/>
+                    <a:p>
+                      <a:pPr algn="ctr"/>
+                      <a:r>
+                        <a:rPr lang="en-US" dirty="0"/>
+                        <a:t>$400</a:t>
+                      </a:r>
+                    </a:p>
+                  </a:txBody>
+                  <a:tcPr/>
+                </a:tc>
+                <a:tc>
+                  <a:txBody>
+                    <a:bodyPr/>
+                    <a:lstStyle/>
+                    <a:p>
+                      <a:pPr algn="ctr"/>
+                      <a:r>
+                        <a:rPr lang="en-US" dirty="0"/>
+                        <a:t>$40</a:t>
+                      </a:r>
+                    </a:p>
+                  </a:txBody>
+                  <a:tcPr/>
+                </a:tc>
+                <a:extLst>
+                  <a:ext uri="{0D108BD9-81ED-4DB2-BD59-A6C34878D82A}">
+                    <a16:rowId xmlns:a16="http://schemas.microsoft.com/office/drawing/2014/main" val="1339274752"/>
+                  </a:ext>
+                </a:extLst>
+              </a:tr>
+            </a:tbl>
+          </a:graphicData>
+        </a:graphic>
+      </p:graphicFrame>
+      <p:graphicFrame>
+        <p:nvGraphicFramePr>
+          <p:cNvPr id="4" name="Table 3">
+            <a:extLst>
+              <a:ext uri="{FF2B5EF4-FFF2-40B4-BE49-F238E27FC236}">
+                <a16:creationId xmlns:a16="http://schemas.microsoft.com/office/drawing/2014/main" id="{502EDFBC-1B4A-9851-6605-5A35DBC68DB5}"/>
+              </a:ext>
+            </a:extLst>
+          </p:cNvPr>
+          <p:cNvGraphicFramePr>
+            <a:graphicFrameLocks noGrp="1"/>
+          </p:cNvGraphicFramePr>
+          <p:nvPr>
+            <p:extLst>
+              <p:ext uri="{D42A27DB-BD31-4B8C-83A1-F6EECF244321}">
+                <p14:modId xmlns:p14="http://schemas.microsoft.com/office/powerpoint/2010/main" val="3644091047"/>
+              </p:ext>
+            </p:extLst>
+          </p:nvPr>
+        </p:nvGraphicFramePr>
+        <p:xfrm>
+          <a:off x="6315456" y="3925823"/>
+          <a:ext cx="3868929" cy="2121070"/>
+        </p:xfrm>
+        <a:graphic>
+          <a:graphicData uri="http://schemas.openxmlformats.org/drawingml/2006/table">
+            <a:tbl>
+              <a:tblPr firstRow="1" bandRow="1">
+                <a:tableStyleId>{7E9639D4-E3E2-4D34-9284-5A2195B3D0D7}</a:tableStyleId>
+              </a:tblPr>
+              <a:tblGrid>
+                <a:gridCol w="1289643">
+                  <a:extLst>
+                    <a:ext uri="{9D8B030D-6E8A-4147-A177-3AD203B41FA5}">
+                      <a16:colId xmlns:a16="http://schemas.microsoft.com/office/drawing/2014/main" val="1702040945"/>
+                    </a:ext>
+                  </a:extLst>
+                </a:gridCol>
+                <a:gridCol w="1289643">
+                  <a:extLst>
+                    <a:ext uri="{9D8B030D-6E8A-4147-A177-3AD203B41FA5}">
+                      <a16:colId xmlns:a16="http://schemas.microsoft.com/office/drawing/2014/main" val="3705740454"/>
+                    </a:ext>
+                  </a:extLst>
+                </a:gridCol>
+                <a:gridCol w="1289643">
+                  <a:extLst>
+                    <a:ext uri="{9D8B030D-6E8A-4147-A177-3AD203B41FA5}">
+                      <a16:colId xmlns:a16="http://schemas.microsoft.com/office/drawing/2014/main" val="1611479893"/>
+                    </a:ext>
+                  </a:extLst>
+                </a:gridCol>
+              </a:tblGrid>
+              <a:tr h="424214">
+                <a:tc>
+                  <a:txBody>
+                    <a:bodyPr/>
+                    <a:lstStyle/>
+                    <a:p>
+                      <a:pPr algn="ctr"/>
+                      <a:r>
+                        <a:rPr lang="en-US" dirty="0"/>
+                        <a:t>Name</a:t>
+                      </a:r>
+                    </a:p>
+                  </a:txBody>
+                  <a:tcPr/>
+                </a:tc>
+                <a:tc>
+                  <a:txBody>
+                    <a:bodyPr/>
+                    <a:lstStyle/>
+                    <a:p>
+                      <a:pPr algn="ctr"/>
+                      <a:r>
+                        <a:rPr lang="en-US" dirty="0"/>
+                        <a:t>Boss</a:t>
+                      </a:r>
+                    </a:p>
+                  </a:txBody>
+                  <a:tcPr/>
+                </a:tc>
+                <a:tc>
+                  <a:txBody>
+                    <a:bodyPr/>
+                    <a:lstStyle/>
+                    <a:p>
+                      <a:pPr algn="ctr"/>
+                      <a:r>
+                        <a:rPr lang="en-US" dirty="0"/>
+                        <a:t>Hire Month</a:t>
+                      </a:r>
+                    </a:p>
+                  </a:txBody>
+                  <a:tcPr/>
+                </a:tc>
+                <a:extLst>
+                  <a:ext uri="{0D108BD9-81ED-4DB2-BD59-A6C34878D82A}">
+                    <a16:rowId xmlns:a16="http://schemas.microsoft.com/office/drawing/2014/main" val="1579985967"/>
+                  </a:ext>
+                </a:extLst>
+              </a:tr>
+              <a:tr h="424214">
+                <a:tc>
+                  <a:txBody>
+                    <a:bodyPr/>
+                    <a:lstStyle/>
+                    <a:p>
+                      <a:pPr algn="ctr"/>
+                      <a:r>
+                        <a:rPr lang="en-US" dirty="0"/>
+                        <a:t>Bob</a:t>
+                      </a:r>
+                    </a:p>
+                  </a:txBody>
+                  <a:tcPr>
+                    <a:solidFill>
+                      <a:srgbClr val="92D050"/>
+                    </a:solidFill>
+                  </a:tcPr>
+                </a:tc>
+                <a:tc>
+                  <a:txBody>
+                    <a:bodyPr/>
+                    <a:lstStyle/>
+                    <a:p>
+                      <a:pPr algn="ctr"/>
+                      <a:endParaRPr lang="en-US" dirty="0"/>
+                    </a:p>
+                  </a:txBody>
+                  <a:tcPr/>
+                </a:tc>
+                <a:tc>
+                  <a:txBody>
+                    <a:bodyPr/>
+                    <a:lstStyle/>
+                    <a:p>
+                      <a:pPr algn="ctr"/>
+                      <a:endParaRPr lang="en-US" dirty="0"/>
+                    </a:p>
+                  </a:txBody>
+                  <a:tcPr/>
+                </a:tc>
+                <a:extLst>
+                  <a:ext uri="{0D108BD9-81ED-4DB2-BD59-A6C34878D82A}">
+                    <a16:rowId xmlns:a16="http://schemas.microsoft.com/office/drawing/2014/main" val="2559393424"/>
+                  </a:ext>
+                </a:extLst>
+              </a:tr>
+              <a:tr h="424214">
+                <a:tc>
+                  <a:txBody>
+                    <a:bodyPr/>
+                    <a:lstStyle/>
+                    <a:p>
+                      <a:pPr algn="ctr"/>
+                      <a:r>
+                        <a:rPr lang="en-US" dirty="0"/>
+                        <a:t>Sarah</a:t>
+                      </a:r>
+                    </a:p>
+                  </a:txBody>
+                  <a:tcPr>
+                    <a:solidFill>
+                      <a:srgbClr val="92D050"/>
+                    </a:solidFill>
+                  </a:tcPr>
+                </a:tc>
+                <a:tc>
+                  <a:txBody>
+                    <a:bodyPr/>
+                    <a:lstStyle/>
+                    <a:p>
+                      <a:pPr algn="ctr"/>
+                      <a:r>
+                        <a:rPr lang="en-US" dirty="0">
+                          <a:solidFill>
+                            <a:srgbClr val="00B050"/>
+                          </a:solidFill>
+                        </a:rPr>
+                        <a:t>Bob</a:t>
+                      </a:r>
+                    </a:p>
+                  </a:txBody>
+                  <a:tcPr/>
+                </a:tc>
+                <a:tc>
+                  <a:txBody>
+                    <a:bodyPr/>
+                    <a:lstStyle/>
+                    <a:p>
+                      <a:pPr algn="ctr"/>
+                      <a:r>
+                        <a:rPr lang="en-US" dirty="0">
+                          <a:solidFill>
+                            <a:srgbClr val="00B0F0"/>
+                          </a:solidFill>
+                        </a:rPr>
+                        <a:t>January</a:t>
+                      </a:r>
+                    </a:p>
+                  </a:txBody>
+                  <a:tcPr/>
+                </a:tc>
+                <a:extLst>
+                  <a:ext uri="{0D108BD9-81ED-4DB2-BD59-A6C34878D82A}">
+                    <a16:rowId xmlns:a16="http://schemas.microsoft.com/office/drawing/2014/main" val="3743697260"/>
+                  </a:ext>
+                </a:extLst>
+              </a:tr>
+              <a:tr h="424214">
+                <a:tc>
+                  <a:txBody>
+                    <a:bodyPr/>
+                    <a:lstStyle/>
+                    <a:p>
+                      <a:pPr algn="ctr"/>
+                      <a:r>
+                        <a:rPr lang="en-US" dirty="0"/>
+                        <a:t>Joe</a:t>
+                      </a:r>
+                    </a:p>
+                  </a:txBody>
+                  <a:tcPr>
+                    <a:solidFill>
+                      <a:srgbClr val="92D050"/>
+                    </a:solidFill>
+                  </a:tcPr>
+                </a:tc>
+                <a:tc>
+                  <a:txBody>
+                    <a:bodyPr/>
+                    <a:lstStyle/>
+                    <a:p>
+                      <a:pPr algn="ctr"/>
+                      <a:r>
+                        <a:rPr lang="en-US" dirty="0">
+                          <a:solidFill>
+                            <a:srgbClr val="00B050"/>
+                          </a:solidFill>
+                        </a:rPr>
+                        <a:t>Bob</a:t>
+                      </a:r>
+                    </a:p>
+                  </a:txBody>
+                  <a:tcPr/>
+                </a:tc>
+                <a:tc>
+                  <a:txBody>
+                    <a:bodyPr/>
+                    <a:lstStyle/>
+                    <a:p>
+                      <a:pPr algn="ctr"/>
+                      <a:r>
+                        <a:rPr lang="en-US" dirty="0">
+                          <a:solidFill>
+                            <a:srgbClr val="00B0F0"/>
+                          </a:solidFill>
+                        </a:rPr>
+                        <a:t>March</a:t>
+                      </a:r>
+                    </a:p>
+                  </a:txBody>
+                  <a:tcPr/>
+                </a:tc>
+                <a:extLst>
+                  <a:ext uri="{0D108BD9-81ED-4DB2-BD59-A6C34878D82A}">
+                    <a16:rowId xmlns:a16="http://schemas.microsoft.com/office/drawing/2014/main" val="800216759"/>
+                  </a:ext>
+                </a:extLst>
+              </a:tr>
+              <a:tr h="424214">
+                <a:tc>
+                  <a:txBody>
+                    <a:bodyPr/>
+                    <a:lstStyle/>
+                    <a:p>
+                      <a:pPr algn="ctr"/>
+                      <a:r>
+                        <a:rPr lang="en-US" dirty="0"/>
+                        <a:t>Jane</a:t>
+                      </a:r>
+                    </a:p>
+                  </a:txBody>
+                  <a:tcPr>
+                    <a:solidFill>
+                      <a:srgbClr val="92D050"/>
+                    </a:solidFill>
+                  </a:tcPr>
+                </a:tc>
+                <a:tc>
+                  <a:txBody>
+                    <a:bodyPr/>
+                    <a:lstStyle/>
+                    <a:p>
+                      <a:pPr algn="ctr"/>
+                      <a:r>
+                        <a:rPr lang="en-US" dirty="0">
+                          <a:solidFill>
+                            <a:srgbClr val="00B050"/>
+                          </a:solidFill>
+                        </a:rPr>
+                        <a:t>Bob</a:t>
+                      </a:r>
+                    </a:p>
+                  </a:txBody>
+                  <a:tcPr/>
+                </a:tc>
+                <a:tc>
+                  <a:txBody>
+                    <a:bodyPr/>
+                    <a:lstStyle/>
+                    <a:p>
+                      <a:pPr algn="ctr"/>
+                      <a:r>
+                        <a:rPr lang="en-US" dirty="0">
+                          <a:solidFill>
+                            <a:srgbClr val="00B0F0"/>
+                          </a:solidFill>
+                        </a:rPr>
+                        <a:t>March</a:t>
+                      </a:r>
+                    </a:p>
+                  </a:txBody>
+                  <a:tcPr/>
+                </a:tc>
+                <a:extLst>
+                  <a:ext uri="{0D108BD9-81ED-4DB2-BD59-A6C34878D82A}">
+                    <a16:rowId xmlns:a16="http://schemas.microsoft.com/office/drawing/2014/main" val="1339274752"/>
+                  </a:ext>
+                </a:extLst>
+              </a:tr>
+            </a:tbl>
+          </a:graphicData>
+        </a:graphic>
+      </p:graphicFrame>
+      <p:cxnSp>
+        <p:nvCxnSpPr>
+          <p:cNvPr id="7" name="Straight Arrow Connector 6">
+            <a:extLst>
+              <a:ext uri="{FF2B5EF4-FFF2-40B4-BE49-F238E27FC236}">
+                <a16:creationId xmlns:a16="http://schemas.microsoft.com/office/drawing/2014/main" id="{FA6CD5F4-2853-ED76-358A-AA6371F8817D}"/>
+              </a:ext>
+            </a:extLst>
+          </p:cNvPr>
+          <p:cNvCxnSpPr>
+            <a:cxnSpLocks/>
+          </p:cNvCxnSpPr>
+          <p:nvPr/>
+        </p:nvCxnSpPr>
+        <p:spPr>
+          <a:xfrm flipH="1" flipV="1">
+            <a:off x="6534912" y="3072384"/>
+            <a:ext cx="2954529" cy="786383"/>
+          </a:xfrm>
+          <a:prstGeom prst="straightConnector1">
+            <a:avLst/>
+          </a:prstGeom>
+          <a:ln w="76200">
+            <a:tailEnd type="triangle"/>
+          </a:ln>
+        </p:spPr>
+        <p:style>
+          <a:lnRef idx="1">
+            <a:schemeClr val="accent1"/>
+          </a:lnRef>
+          <a:fillRef idx="0">
+            <a:schemeClr val="accent1"/>
+          </a:fillRef>
+          <a:effectRef idx="0">
+            <a:schemeClr val="accent1"/>
+          </a:effectRef>
+          <a:fontRef idx="minor">
+            <a:schemeClr val="tx1"/>
+          </a:fontRef>
+        </p:style>
+      </p:cxnSp>
+      <p:cxnSp>
+        <p:nvCxnSpPr>
+          <p:cNvPr id="10" name="Straight Arrow Connector 9">
+            <a:extLst>
+              <a:ext uri="{FF2B5EF4-FFF2-40B4-BE49-F238E27FC236}">
+                <a16:creationId xmlns:a16="http://schemas.microsoft.com/office/drawing/2014/main" id="{0285DE3D-5AA4-E4BB-19EF-83DC94F32B52}"/>
+              </a:ext>
+            </a:extLst>
+          </p:cNvPr>
+          <p:cNvCxnSpPr>
+            <a:cxnSpLocks/>
+          </p:cNvCxnSpPr>
+          <p:nvPr/>
+        </p:nvCxnSpPr>
+        <p:spPr>
+          <a:xfrm flipV="1">
+            <a:off x="4974336" y="2987040"/>
+            <a:ext cx="1121664" cy="1414272"/>
+          </a:xfrm>
+          <a:prstGeom prst="straightConnector1">
+            <a:avLst/>
+          </a:prstGeom>
+          <a:ln w="76200">
+            <a:tailEnd type="triangle"/>
+          </a:ln>
+        </p:spPr>
+        <p:style>
+          <a:lnRef idx="1">
+            <a:schemeClr val="accent1"/>
+          </a:lnRef>
+          <a:fillRef idx="0">
+            <a:schemeClr val="accent1"/>
+          </a:fillRef>
+          <a:effectRef idx="0">
+            <a:schemeClr val="accent1"/>
+          </a:effectRef>
+          <a:fontRef idx="minor">
+            <a:schemeClr val="tx1"/>
+          </a:fontRef>
+        </p:style>
+      </p:cxnSp>
+      <p:cxnSp>
+        <p:nvCxnSpPr>
+          <p:cNvPr id="14" name="Straight Arrow Connector 13">
+            <a:extLst>
+              <a:ext uri="{FF2B5EF4-FFF2-40B4-BE49-F238E27FC236}">
+                <a16:creationId xmlns:a16="http://schemas.microsoft.com/office/drawing/2014/main" id="{844368D8-C646-0A64-5D8A-9737F316AD8C}"/>
+              </a:ext>
+            </a:extLst>
+          </p:cNvPr>
+          <p:cNvCxnSpPr>
+            <a:cxnSpLocks/>
+          </p:cNvCxnSpPr>
+          <p:nvPr/>
+        </p:nvCxnSpPr>
+        <p:spPr>
+          <a:xfrm>
+            <a:off x="3450336" y="4998550"/>
+            <a:ext cx="2755392" cy="914570"/>
+          </a:xfrm>
+          <a:prstGeom prst="straightConnector1">
+            <a:avLst/>
+          </a:prstGeom>
+          <a:ln w="76200">
+            <a:solidFill>
+              <a:srgbClr val="92D050"/>
+            </a:solidFill>
+            <a:tailEnd type="triangle"/>
+          </a:ln>
+        </p:spPr>
+        <p:style>
+          <a:lnRef idx="1">
+            <a:schemeClr val="accent1"/>
+          </a:lnRef>
+          <a:fillRef idx="0">
+            <a:schemeClr val="accent1"/>
+          </a:fillRef>
+          <a:effectRef idx="0">
+            <a:schemeClr val="accent1"/>
+          </a:effectRef>
+          <a:fontRef idx="minor">
+            <a:schemeClr val="tx1"/>
+          </a:fontRef>
+        </p:style>
+      </p:cxnSp>
+      <p:cxnSp>
+        <p:nvCxnSpPr>
+          <p:cNvPr id="18" name="Straight Arrow Connector 17">
+            <a:extLst>
+              <a:ext uri="{FF2B5EF4-FFF2-40B4-BE49-F238E27FC236}">
+                <a16:creationId xmlns:a16="http://schemas.microsoft.com/office/drawing/2014/main" id="{79EBBC2B-C9A6-D8B8-412A-1114A377EDC8}"/>
+              </a:ext>
+            </a:extLst>
+          </p:cNvPr>
+          <p:cNvCxnSpPr>
+            <a:cxnSpLocks/>
+          </p:cNvCxnSpPr>
+          <p:nvPr/>
+        </p:nvCxnSpPr>
+        <p:spPr>
+          <a:xfrm flipH="1" flipV="1">
+            <a:off x="6998208" y="6138036"/>
+            <a:ext cx="556768" cy="365845"/>
+          </a:xfrm>
+          <a:prstGeom prst="straightConnector1">
+            <a:avLst/>
+          </a:prstGeom>
+          <a:ln w="76200">
+            <a:solidFill>
+              <a:srgbClr val="92D050"/>
+            </a:solidFill>
+            <a:tailEnd type="triangle"/>
+          </a:ln>
+        </p:spPr>
+        <p:style>
+          <a:lnRef idx="1">
+            <a:schemeClr val="accent1"/>
+          </a:lnRef>
+          <a:fillRef idx="0">
+            <a:schemeClr val="accent1"/>
+          </a:fillRef>
+          <a:effectRef idx="0">
+            <a:schemeClr val="accent1"/>
+          </a:effectRef>
+          <a:fontRef idx="minor">
+            <a:schemeClr val="tx1"/>
+          </a:fontRef>
+        </p:style>
+      </p:cxnSp>
+      <p:cxnSp>
+        <p:nvCxnSpPr>
+          <p:cNvPr id="22" name="Straight Connector 21">
+            <a:extLst>
+              <a:ext uri="{FF2B5EF4-FFF2-40B4-BE49-F238E27FC236}">
+                <a16:creationId xmlns:a16="http://schemas.microsoft.com/office/drawing/2014/main" id="{BC4A435C-6176-622C-B954-5332AB04F5E7}"/>
+              </a:ext>
+            </a:extLst>
+          </p:cNvPr>
+          <p:cNvCxnSpPr>
+            <a:cxnSpLocks/>
+          </p:cNvCxnSpPr>
+          <p:nvPr/>
+        </p:nvCxnSpPr>
+        <p:spPr>
+          <a:xfrm flipV="1">
+            <a:off x="7530592" y="6046893"/>
+            <a:ext cx="670560" cy="444796"/>
+          </a:xfrm>
+          <a:prstGeom prst="line">
+            <a:avLst/>
+          </a:prstGeom>
+          <a:ln w="76200">
+            <a:solidFill>
+              <a:srgbClr val="92D050"/>
+            </a:solidFill>
+          </a:ln>
+        </p:spPr>
+        <p:style>
+          <a:lnRef idx="1">
+            <a:schemeClr val="accent1"/>
+          </a:lnRef>
+          <a:fillRef idx="0">
+            <a:schemeClr val="accent1"/>
+          </a:fillRef>
+          <a:effectRef idx="0">
+            <a:schemeClr val="accent1"/>
+          </a:effectRef>
+          <a:fontRef idx="minor">
+            <a:schemeClr val="tx1"/>
+          </a:fontRef>
+        </p:style>
+      </p:cxnSp>
+    </p:spTree>
+    <p:extLst>
+      <p:ext uri="{BB962C8B-B14F-4D97-AF65-F5344CB8AC3E}">
+        <p14:creationId xmlns:p14="http://schemas.microsoft.com/office/powerpoint/2010/main" val="2998915098"/>
+      </p:ext>
+    </p:extLst>
+  </p:cSld>
+  <p:clrMapOvr>
+    <a:masterClrMapping/>
+  </p:clrMapOvr>
+</p:sld>
+</file>
+
+<file path=ppt/slides/slide4.xml><?xml version="1.0" encoding="utf-8"?>
+<p:sld xmlns:a="http://schemas.openxmlformats.org/drawingml/2006/main" xmlns:r="http://schemas.openxmlformats.org/officeDocument/2006/relationships" xmlns:p="http://schemas.openxmlformats.org/presentationml/2006/main">
+  <p:cSld>
+    <p:spTree>
+      <p:nvGrpSpPr>
+        <p:cNvPr id="1" name=""/>
+        <p:cNvGrpSpPr/>
+        <p:nvPr/>
+      </p:nvGrpSpPr>
+      <p:grpSpPr>
+        <a:xfrm>
+          <a:off x="0" y="0"/>
+          <a:ext cx="0" cy="0"/>
+          <a:chOff x="0" y="0"/>
+          <a:chExt cx="0" cy="0"/>
+        </a:xfrm>
+      </p:grpSpPr>
+      <p:graphicFrame>
+        <p:nvGraphicFramePr>
+          <p:cNvPr id="4" name="Table 3">
+            <a:extLst>
+              <a:ext uri="{FF2B5EF4-FFF2-40B4-BE49-F238E27FC236}">
+                <a16:creationId xmlns:a16="http://schemas.microsoft.com/office/drawing/2014/main" id="{502EDFBC-1B4A-9851-6605-5A35DBC68DB5}"/>
+              </a:ext>
+            </a:extLst>
+          </p:cNvPr>
+          <p:cNvGraphicFramePr>
+            <a:graphicFrameLocks noGrp="1"/>
+          </p:cNvGraphicFramePr>
+          <p:nvPr>
+            <p:extLst>
+              <p:ext uri="{D42A27DB-BD31-4B8C-83A1-F6EECF244321}">
+                <p14:modId xmlns:p14="http://schemas.microsoft.com/office/powerpoint/2010/main" val="1321842364"/>
+              </p:ext>
+            </p:extLst>
+          </p:nvPr>
+        </p:nvGraphicFramePr>
+        <p:xfrm>
+          <a:off x="1681360" y="521520"/>
+          <a:ext cx="6965490" cy="5410352"/>
+        </p:xfrm>
+        <a:graphic>
+          <a:graphicData uri="http://schemas.openxmlformats.org/drawingml/2006/table">
+            <a:tbl>
+              <a:tblPr firstRow="1" bandRow="1">
+                <a:tableStyleId>{7E9639D4-E3E2-4D34-9284-5A2195B3D0D7}</a:tableStyleId>
+              </a:tblPr>
+              <a:tblGrid>
+                <a:gridCol w="1393098">
+                  <a:extLst>
+                    <a:ext uri="{9D8B030D-6E8A-4147-A177-3AD203B41FA5}">
+                      <a16:colId xmlns:a16="http://schemas.microsoft.com/office/drawing/2014/main" val="3802580321"/>
+                    </a:ext>
+                  </a:extLst>
+                </a:gridCol>
+                <a:gridCol w="1393098">
+                  <a:extLst>
+                    <a:ext uri="{9D8B030D-6E8A-4147-A177-3AD203B41FA5}">
+                      <a16:colId xmlns:a16="http://schemas.microsoft.com/office/drawing/2014/main" val="1702040945"/>
+                    </a:ext>
+                  </a:extLst>
+                </a:gridCol>
+                <a:gridCol w="1393098">
+                  <a:extLst>
+                    <a:ext uri="{9D8B030D-6E8A-4147-A177-3AD203B41FA5}">
+                      <a16:colId xmlns:a16="http://schemas.microsoft.com/office/drawing/2014/main" val="3336297722"/>
+                    </a:ext>
+                  </a:extLst>
+                </a:gridCol>
+                <a:gridCol w="1393098">
+                  <a:extLst>
+                    <a:ext uri="{9D8B030D-6E8A-4147-A177-3AD203B41FA5}">
+                      <a16:colId xmlns:a16="http://schemas.microsoft.com/office/drawing/2014/main" val="3705740454"/>
+                    </a:ext>
+                  </a:extLst>
+                </a:gridCol>
+                <a:gridCol w="1393098">
+                  <a:extLst>
+                    <a:ext uri="{9D8B030D-6E8A-4147-A177-3AD203B41FA5}">
+                      <a16:colId xmlns:a16="http://schemas.microsoft.com/office/drawing/2014/main" val="608078438"/>
+                    </a:ext>
+                  </a:extLst>
+                </a:gridCol>
+              </a:tblGrid>
+              <a:tr h="676294">
+                <a:tc>
+                  <a:txBody>
+                    <a:bodyPr/>
+                    <a:lstStyle/>
+                    <a:p>
+                      <a:pPr algn="ctr"/>
+                      <a:r>
+                        <a:rPr lang="en-US" dirty="0"/>
+                        <a:t>ID</a:t>
+                      </a:r>
+                    </a:p>
+                  </a:txBody>
+                  <a:tcPr anchor="ctr"/>
+                </a:tc>
+                <a:tc>
+                  <a:txBody>
+                    <a:bodyPr/>
+                    <a:lstStyle/>
+                    <a:p>
+                      <a:pPr algn="ctr"/>
+                      <a:r>
+                        <a:rPr lang="en-US" dirty="0"/>
+                        <a:t>Name</a:t>
+                      </a:r>
+                    </a:p>
+                  </a:txBody>
+                  <a:tcPr anchor="ctr"/>
+                </a:tc>
+                <a:tc>
+                  <a:txBody>
+                    <a:bodyPr/>
+                    <a:lstStyle/>
+                    <a:p>
+                      <a:pPr algn="ctr"/>
+                      <a:r>
+                        <a:rPr lang="en-US" dirty="0"/>
+                        <a:t>Job</a:t>
+                      </a:r>
+                    </a:p>
+                  </a:txBody>
+                  <a:tcPr anchor="ctr"/>
+                </a:tc>
+                <a:tc>
+                  <a:txBody>
+                    <a:bodyPr/>
+                    <a:lstStyle/>
+                    <a:p>
+                      <a:pPr algn="ctr"/>
+                      <a:r>
+                        <a:rPr lang="en-US" dirty="0"/>
+                        <a:t>Boss ID</a:t>
+                      </a:r>
+                    </a:p>
+                  </a:txBody>
+                  <a:tcPr anchor="ctr"/>
+                </a:tc>
+                <a:tc>
+                  <a:txBody>
+                    <a:bodyPr/>
+                    <a:lstStyle/>
+                    <a:p>
+                      <a:pPr algn="ctr"/>
+                      <a:r>
+                        <a:rPr lang="en-US" dirty="0"/>
+                        <a:t>Recruiter ID</a:t>
+                      </a:r>
+                    </a:p>
+                  </a:txBody>
+                  <a:tcPr anchor="ctr"/>
+                </a:tc>
+                <a:extLst>
+                  <a:ext uri="{0D108BD9-81ED-4DB2-BD59-A6C34878D82A}">
+                    <a16:rowId xmlns:a16="http://schemas.microsoft.com/office/drawing/2014/main" val="1579985967"/>
+                  </a:ext>
+                </a:extLst>
+              </a:tr>
+              <a:tr h="676294">
+                <a:tc>
+                  <a:txBody>
+                    <a:bodyPr/>
+                    <a:lstStyle/>
+                    <a:p>
+                      <a:pPr algn="ctr"/>
+                      <a:r>
+                        <a:rPr lang="en-US" dirty="0"/>
+                        <a:t>1</a:t>
+                      </a:r>
+                    </a:p>
+                  </a:txBody>
+                  <a:tcPr anchor="ctr">
+                    <a:solidFill>
+                      <a:srgbClr val="92D050"/>
+                    </a:solidFill>
+                  </a:tcPr>
+                </a:tc>
+                <a:tc>
+                  <a:txBody>
+                    <a:bodyPr/>
+                    <a:lstStyle/>
+                    <a:p>
+                      <a:pPr algn="ctr"/>
+                      <a:r>
+                        <a:rPr lang="en-US" dirty="0"/>
+                        <a:t>Sarah</a:t>
+                      </a:r>
+                    </a:p>
+                  </a:txBody>
+                  <a:tcPr anchor="ctr">
+                    <a:noFill/>
+                  </a:tcPr>
+                </a:tc>
+                <a:tc>
+                  <a:txBody>
+                    <a:bodyPr/>
+                    <a:lstStyle/>
+                    <a:p>
+                      <a:pPr algn="ctr"/>
+                      <a:r>
+                        <a:rPr lang="en-US" dirty="0"/>
+                        <a:t>CEO</a:t>
+                      </a:r>
+                    </a:p>
+                  </a:txBody>
+                  <a:tcPr anchor="ctr">
+                    <a:noFill/>
+                  </a:tcPr>
+                </a:tc>
+                <a:tc>
+                  <a:txBody>
+                    <a:bodyPr/>
+                    <a:lstStyle/>
+                    <a:p>
+                      <a:pPr algn="ctr"/>
+                      <a:endParaRPr lang="en-US" dirty="0"/>
+                    </a:p>
+                  </a:txBody>
+                  <a:tcPr anchor="ctr"/>
+                </a:tc>
+                <a:tc>
+                  <a:txBody>
+                    <a:bodyPr/>
+                    <a:lstStyle/>
+                    <a:p>
+                      <a:pPr algn="ctr"/>
+                      <a:endParaRPr lang="en-US" dirty="0"/>
+                    </a:p>
+                  </a:txBody>
+                  <a:tcPr anchor="ctr"/>
+                </a:tc>
+                <a:extLst>
+                  <a:ext uri="{0D108BD9-81ED-4DB2-BD59-A6C34878D82A}">
+                    <a16:rowId xmlns:a16="http://schemas.microsoft.com/office/drawing/2014/main" val="2559393424"/>
+                  </a:ext>
+                </a:extLst>
+              </a:tr>
+              <a:tr h="676294">
+                <a:tc>
+                  <a:txBody>
+                    <a:bodyPr/>
+                    <a:lstStyle/>
+                    <a:p>
+                      <a:pPr algn="ctr"/>
+                      <a:r>
+                        <a:rPr lang="en-US" dirty="0"/>
+                        <a:t>2</a:t>
+                      </a:r>
+                    </a:p>
+                  </a:txBody>
+                  <a:tcPr anchor="ctr">
+                    <a:solidFill>
+                      <a:srgbClr val="92D050"/>
+                    </a:solidFill>
+                  </a:tcPr>
+                </a:tc>
+                <a:tc>
+                  <a:txBody>
+                    <a:bodyPr/>
+                    <a:lstStyle/>
+                    <a:p>
+                      <a:pPr algn="ctr"/>
+                      <a:r>
+                        <a:rPr lang="en-US" dirty="0"/>
+                        <a:t>Robert</a:t>
+                      </a:r>
+                    </a:p>
+                  </a:txBody>
+                  <a:tcPr anchor="ctr">
+                    <a:noFill/>
+                  </a:tcPr>
+                </a:tc>
+                <a:tc>
+                  <a:txBody>
+                    <a:bodyPr/>
+                    <a:lstStyle/>
+                    <a:p>
+                      <a:pPr algn="ctr"/>
+                      <a:r>
+                        <a:rPr lang="en-US" dirty="0"/>
+                        <a:t>VP, Finance</a:t>
+                      </a:r>
+                    </a:p>
+                  </a:txBody>
+                  <a:tcPr anchor="ctr">
+                    <a:noFill/>
+                  </a:tcPr>
+                </a:tc>
+                <a:tc>
+                  <a:txBody>
+                    <a:bodyPr/>
+                    <a:lstStyle/>
+                    <a:p>
+                      <a:pPr algn="ctr"/>
+                      <a:r>
+                        <a:rPr lang="en-US" dirty="0">
+                          <a:solidFill>
+                            <a:srgbClr val="00B050"/>
+                          </a:solidFill>
+                        </a:rPr>
+                        <a:t>1</a:t>
+                      </a:r>
+                    </a:p>
+                  </a:txBody>
+                  <a:tcPr anchor="ctr"/>
+                </a:tc>
+                <a:tc>
+                  <a:txBody>
+                    <a:bodyPr/>
+                    <a:lstStyle/>
+                    <a:p>
+                      <a:pPr algn="ctr"/>
+                      <a:r>
+                        <a:rPr lang="en-US" dirty="0">
+                          <a:solidFill>
+                            <a:srgbClr val="00B0F0"/>
+                          </a:solidFill>
+                        </a:rPr>
+                        <a:t>3</a:t>
+                      </a:r>
+                    </a:p>
+                  </a:txBody>
+                  <a:tcPr anchor="ctr"/>
+                </a:tc>
+                <a:extLst>
+                  <a:ext uri="{0D108BD9-81ED-4DB2-BD59-A6C34878D82A}">
+                    <a16:rowId xmlns:a16="http://schemas.microsoft.com/office/drawing/2014/main" val="3743697260"/>
+                  </a:ext>
+                </a:extLst>
+              </a:tr>
+              <a:tr h="676294">
+                <a:tc>
+                  <a:txBody>
+                    <a:bodyPr/>
+                    <a:lstStyle/>
+                    <a:p>
+                      <a:pPr algn="ctr"/>
+                      <a:r>
+                        <a:rPr lang="en-US" dirty="0"/>
+                        <a:t>3</a:t>
+                      </a:r>
+                    </a:p>
+                  </a:txBody>
+                  <a:tcPr anchor="ctr">
+                    <a:solidFill>
+                      <a:srgbClr val="92D050"/>
+                    </a:solidFill>
+                  </a:tcPr>
+                </a:tc>
+                <a:tc>
+                  <a:txBody>
+                    <a:bodyPr/>
+                    <a:lstStyle/>
+                    <a:p>
+                      <a:pPr algn="ctr"/>
+                      <a:r>
+                        <a:rPr lang="en-US" dirty="0"/>
+                        <a:t>Joe</a:t>
+                      </a:r>
+                    </a:p>
+                  </a:txBody>
+                  <a:tcPr anchor="ctr">
+                    <a:noFill/>
+                  </a:tcPr>
+                </a:tc>
+                <a:tc>
+                  <a:txBody>
+                    <a:bodyPr/>
+                    <a:lstStyle/>
+                    <a:p>
+                      <a:pPr algn="ctr"/>
+                      <a:r>
+                        <a:rPr lang="en-US" dirty="0"/>
+                        <a:t>VP, HR</a:t>
+                      </a:r>
+                    </a:p>
+                  </a:txBody>
+                  <a:tcPr anchor="ctr">
+                    <a:noFill/>
+                  </a:tcPr>
+                </a:tc>
+                <a:tc>
+                  <a:txBody>
+                    <a:bodyPr/>
+                    <a:lstStyle/>
+                    <a:p>
+                      <a:pPr algn="ctr"/>
+                      <a:r>
+                        <a:rPr lang="en-US" dirty="0">
+                          <a:solidFill>
+                            <a:srgbClr val="00B050"/>
+                          </a:solidFill>
+                        </a:rPr>
+                        <a:t>1</a:t>
+                      </a:r>
+                    </a:p>
+                  </a:txBody>
+                  <a:tcPr anchor="ctr"/>
+                </a:tc>
+                <a:tc>
+                  <a:txBody>
+                    <a:bodyPr/>
+                    <a:lstStyle/>
+                    <a:p>
+                      <a:pPr algn="ctr"/>
+                      <a:r>
+                        <a:rPr lang="en-US" dirty="0">
+                          <a:solidFill>
+                            <a:srgbClr val="00B0F0"/>
+                          </a:solidFill>
+                        </a:rPr>
+                        <a:t>3</a:t>
+                      </a:r>
+                    </a:p>
+                  </a:txBody>
+                  <a:tcPr anchor="ctr"/>
+                </a:tc>
+                <a:extLst>
+                  <a:ext uri="{0D108BD9-81ED-4DB2-BD59-A6C34878D82A}">
+                    <a16:rowId xmlns:a16="http://schemas.microsoft.com/office/drawing/2014/main" val="800216759"/>
+                  </a:ext>
+                </a:extLst>
+              </a:tr>
+              <a:tr h="676294">
+                <a:tc>
+                  <a:txBody>
+                    <a:bodyPr/>
+                    <a:lstStyle/>
+                    <a:p>
+                      <a:pPr algn="ctr"/>
+                      <a:r>
+                        <a:rPr lang="en-US" dirty="0"/>
+                        <a:t>4</a:t>
+                      </a:r>
+                    </a:p>
+                  </a:txBody>
+                  <a:tcPr anchor="ctr">
+                    <a:solidFill>
+                      <a:srgbClr val="92D050"/>
+                    </a:solidFill>
+                  </a:tcPr>
+                </a:tc>
+                <a:tc>
+                  <a:txBody>
+                    <a:bodyPr/>
+                    <a:lstStyle/>
+                    <a:p>
+                      <a:pPr algn="ctr"/>
+                      <a:r>
+                        <a:rPr lang="en-US" dirty="0"/>
+                        <a:t>Jane</a:t>
+                      </a:r>
+                    </a:p>
+                  </a:txBody>
+                  <a:tcPr anchor="ctr">
+                    <a:noFill/>
+                  </a:tcPr>
+                </a:tc>
+                <a:tc>
+                  <a:txBody>
+                    <a:bodyPr/>
+                    <a:lstStyle/>
+                    <a:p>
+                      <a:pPr algn="ctr"/>
+                      <a:r>
+                        <a:rPr lang="en-US" dirty="0"/>
+                        <a:t>Accountant</a:t>
+                      </a:r>
+                    </a:p>
+                  </a:txBody>
+                  <a:tcPr anchor="ctr">
+                    <a:noFill/>
+                  </a:tcPr>
+                </a:tc>
+                <a:tc>
+                  <a:txBody>
+                    <a:bodyPr/>
+                    <a:lstStyle/>
+                    <a:p>
+                      <a:pPr algn="ctr"/>
+                      <a:r>
+                        <a:rPr lang="en-US" dirty="0">
+                          <a:solidFill>
+                            <a:srgbClr val="00B050"/>
+                          </a:solidFill>
+                        </a:rPr>
+                        <a:t>2</a:t>
+                      </a:r>
+                    </a:p>
+                  </a:txBody>
+                  <a:tcPr anchor="ctr"/>
+                </a:tc>
+                <a:tc>
+                  <a:txBody>
+                    <a:bodyPr/>
+                    <a:lstStyle/>
+                    <a:p>
+                      <a:pPr algn="ctr"/>
+                      <a:r>
+                        <a:rPr lang="en-US" dirty="0">
+                          <a:solidFill>
+                            <a:srgbClr val="00B0F0"/>
+                          </a:solidFill>
+                        </a:rPr>
+                        <a:t>9</a:t>
+                      </a:r>
+                    </a:p>
+                  </a:txBody>
+                  <a:tcPr anchor="ctr"/>
+                </a:tc>
+                <a:extLst>
+                  <a:ext uri="{0D108BD9-81ED-4DB2-BD59-A6C34878D82A}">
+                    <a16:rowId xmlns:a16="http://schemas.microsoft.com/office/drawing/2014/main" val="1339274752"/>
+                  </a:ext>
+                </a:extLst>
+              </a:tr>
+              <a:tr h="676294">
+                <a:tc>
+                  <a:txBody>
+                    <a:bodyPr/>
+                    <a:lstStyle/>
+                    <a:p>
+                      <a:pPr algn="ctr"/>
+                      <a:r>
+                        <a:rPr lang="en-US" dirty="0"/>
+                        <a:t>5</a:t>
+                      </a:r>
+                    </a:p>
+                  </a:txBody>
+                  <a:tcPr anchor="ctr">
+                    <a:solidFill>
+                      <a:srgbClr val="92D050"/>
+                    </a:solidFill>
+                  </a:tcPr>
+                </a:tc>
+                <a:tc>
+                  <a:txBody>
+                    <a:bodyPr/>
+                    <a:lstStyle/>
+                    <a:p>
+                      <a:pPr algn="ctr"/>
+                      <a:r>
+                        <a:rPr lang="en-US" dirty="0"/>
+                        <a:t>Joseph</a:t>
+                      </a:r>
+                    </a:p>
+                  </a:txBody>
+                  <a:tcPr anchor="ctr">
+                    <a:noFill/>
+                  </a:tcPr>
+                </a:tc>
+                <a:tc>
+                  <a:txBody>
+                    <a:bodyPr/>
+                    <a:lstStyle/>
+                    <a:p>
+                      <a:pPr algn="ctr"/>
+                      <a:r>
+                        <a:rPr lang="en-US" dirty="0"/>
+                        <a:t>Accountant</a:t>
+                      </a:r>
+                    </a:p>
+                  </a:txBody>
+                  <a:tcPr anchor="ctr">
+                    <a:noFill/>
+                  </a:tcPr>
+                </a:tc>
+                <a:tc>
+                  <a:txBody>
+                    <a:bodyPr/>
+                    <a:lstStyle/>
+                    <a:p>
+                      <a:pPr algn="ctr"/>
+                      <a:r>
+                        <a:rPr lang="en-US" dirty="0">
+                          <a:solidFill>
+                            <a:srgbClr val="00B050"/>
+                          </a:solidFill>
+                        </a:rPr>
+                        <a:t>2</a:t>
+                      </a:r>
+                    </a:p>
+                  </a:txBody>
+                  <a:tcPr anchor="ctr"/>
+                </a:tc>
+                <a:tc>
+                  <a:txBody>
+                    <a:bodyPr/>
+                    <a:lstStyle/>
+                    <a:p>
+                      <a:pPr algn="ctr"/>
+                      <a:r>
+                        <a:rPr lang="en-US" dirty="0">
+                          <a:solidFill>
+                            <a:srgbClr val="00B0F0"/>
+                          </a:solidFill>
+                        </a:rPr>
+                        <a:t>3</a:t>
+                      </a:r>
+                    </a:p>
+                  </a:txBody>
+                  <a:tcPr anchor="ctr"/>
+                </a:tc>
+                <a:extLst>
+                  <a:ext uri="{0D108BD9-81ED-4DB2-BD59-A6C34878D82A}">
+                    <a16:rowId xmlns:a16="http://schemas.microsoft.com/office/drawing/2014/main" val="2942249098"/>
+                  </a:ext>
+                </a:extLst>
+              </a:tr>
+              <a:tr h="676294">
+                <a:tc>
+                  <a:txBody>
+                    <a:bodyPr/>
+                    <a:lstStyle/>
+                    <a:p>
+                      <a:pPr algn="ctr"/>
+                      <a:r>
+                        <a:rPr lang="en-US" dirty="0"/>
+                        <a:t>6</a:t>
+                      </a:r>
+                    </a:p>
+                  </a:txBody>
+                  <a:tcPr anchor="ctr">
+                    <a:solidFill>
+                      <a:srgbClr val="92D050"/>
+                    </a:solidFill>
+                  </a:tcPr>
+                </a:tc>
+                <a:tc>
+                  <a:txBody>
+                    <a:bodyPr/>
+                    <a:lstStyle/>
+                    <a:p>
+                      <a:pPr algn="ctr"/>
+                      <a:r>
+                        <a:rPr lang="en-US" dirty="0"/>
+                        <a:t>Ann</a:t>
+                      </a:r>
+                    </a:p>
+                  </a:txBody>
+                  <a:tcPr anchor="ctr">
+                    <a:noFill/>
+                  </a:tcPr>
+                </a:tc>
+                <a:tc>
+                  <a:txBody>
+                    <a:bodyPr/>
+                    <a:lstStyle/>
+                    <a:p>
+                      <a:pPr algn="ctr"/>
+                      <a:r>
+                        <a:rPr lang="en-US" dirty="0"/>
+                        <a:t>Recruiting</a:t>
+                      </a:r>
+                    </a:p>
+                  </a:txBody>
+                  <a:tcPr anchor="ctr">
+                    <a:noFill/>
+                  </a:tcPr>
+                </a:tc>
+                <a:tc>
+                  <a:txBody>
+                    <a:bodyPr/>
+                    <a:lstStyle/>
+                    <a:p>
+                      <a:pPr algn="ctr"/>
+                      <a:r>
+                        <a:rPr lang="en-US" dirty="0">
+                          <a:solidFill>
+                            <a:srgbClr val="00B050"/>
+                          </a:solidFill>
+                        </a:rPr>
+                        <a:t>3</a:t>
+                      </a:r>
+                    </a:p>
+                  </a:txBody>
+                  <a:tcPr anchor="ctr"/>
+                </a:tc>
+                <a:tc>
+                  <a:txBody>
+                    <a:bodyPr/>
+                    <a:lstStyle/>
+                    <a:p>
+                      <a:pPr algn="ctr"/>
+                      <a:endParaRPr lang="en-US" dirty="0">
+                        <a:solidFill>
+                          <a:srgbClr val="00B0F0"/>
+                        </a:solidFill>
+                      </a:endParaRPr>
+                    </a:p>
+                  </a:txBody>
+                  <a:tcPr anchor="ctr"/>
+                </a:tc>
+                <a:extLst>
+                  <a:ext uri="{0D108BD9-81ED-4DB2-BD59-A6C34878D82A}">
+                    <a16:rowId xmlns:a16="http://schemas.microsoft.com/office/drawing/2014/main" val="395248725"/>
+                  </a:ext>
+                </a:extLst>
+              </a:tr>
+              <a:tr h="676294">
+                <a:tc>
+                  <a:txBody>
+                    <a:bodyPr/>
+                    <a:lstStyle/>
+                    <a:p>
+                      <a:pPr algn="ctr"/>
+                      <a:r>
+                        <a:rPr lang="en-US" dirty="0"/>
+                        <a:t>7</a:t>
+                      </a:r>
+                    </a:p>
+                  </a:txBody>
+                  <a:tcPr anchor="ctr">
+                    <a:solidFill>
+                      <a:srgbClr val="92D050"/>
+                    </a:solidFill>
+                  </a:tcPr>
+                </a:tc>
+                <a:tc>
+                  <a:txBody>
+                    <a:bodyPr/>
+                    <a:lstStyle/>
+                    <a:p>
+                      <a:pPr algn="ctr"/>
+                      <a:r>
+                        <a:rPr lang="en-US" dirty="0"/>
+                        <a:t>Tara</a:t>
+                      </a:r>
+                    </a:p>
+                  </a:txBody>
+                  <a:tcPr anchor="ctr">
+                    <a:noFill/>
+                  </a:tcPr>
+                </a:tc>
+                <a:tc>
+                  <a:txBody>
+                    <a:bodyPr/>
+                    <a:lstStyle/>
+                    <a:p>
+                      <a:pPr algn="ctr"/>
+                      <a:r>
+                        <a:rPr lang="en-US" dirty="0"/>
+                        <a:t>Internal Audit</a:t>
+                      </a:r>
+                    </a:p>
+                  </a:txBody>
+                  <a:tcPr anchor="ctr">
+                    <a:noFill/>
+                  </a:tcPr>
+                </a:tc>
+                <a:tc>
+                  <a:txBody>
+                    <a:bodyPr/>
+                    <a:lstStyle/>
+                    <a:p>
+                      <a:pPr algn="ctr"/>
+                      <a:endParaRPr lang="en-US" dirty="0">
+                        <a:solidFill>
+                          <a:srgbClr val="00B050"/>
+                        </a:solidFill>
+                      </a:endParaRPr>
+                    </a:p>
+                  </a:txBody>
+                  <a:tcPr anchor="ctr"/>
+                </a:tc>
+                <a:tc>
+                  <a:txBody>
+                    <a:bodyPr/>
+                    <a:lstStyle/>
+                    <a:p>
+                      <a:pPr algn="ctr"/>
+                      <a:r>
+                        <a:rPr lang="en-US" dirty="0">
+                          <a:solidFill>
+                            <a:srgbClr val="00B0F0"/>
+                          </a:solidFill>
+                        </a:rPr>
+                        <a:t>9</a:t>
+                      </a:r>
+                    </a:p>
+                  </a:txBody>
+                  <a:tcPr anchor="ctr"/>
+                </a:tc>
+                <a:extLst>
+                  <a:ext uri="{0D108BD9-81ED-4DB2-BD59-A6C34878D82A}">
+                    <a16:rowId xmlns:a16="http://schemas.microsoft.com/office/drawing/2014/main" val="1070272980"/>
+                  </a:ext>
+                </a:extLst>
+              </a:tr>
+            </a:tbl>
+          </a:graphicData>
+        </a:graphic>
+      </p:graphicFrame>
+    </p:spTree>
+    <p:extLst>
+      <p:ext uri="{BB962C8B-B14F-4D97-AF65-F5344CB8AC3E}">
+        <p14:creationId xmlns:p14="http://schemas.microsoft.com/office/powerpoint/2010/main" val="4163003112"/>
+      </p:ext>
+    </p:extLst>
+  </p:cSld>
+  <p:clrMapOvr>
+    <a:masterClrMapping/>
+  </p:clrMapOvr>
+</p:sld>
+</file>
+
 <file path=ppt/theme/theme1.xml><?xml version="1.0" encoding="utf-8"?>
 <a:theme xmlns:a="http://schemas.openxmlformats.org/drawingml/2006/main" name="Office Theme">
   <a:themeElements>

</xml_diff>